<commit_message>
Added Heroku to technologies used slide
</commit_message>
<xml_diff>
--- a/Garage Project.pptx
+++ b/Garage Project.pptx
@@ -8234,7 +8234,7 @@
         <p:spPr>
           <a:xfrm>
             <a:off x="2589212" y="2079625"/>
-            <a:ext cx="8702243" cy="3602182"/>
+            <a:ext cx="8702243" cy="4168775"/>
           </a:xfrm>
           <a:prstGeom prst="rect">
             <a:avLst/>
@@ -8643,8 +8643,29 @@
               <a:buChar char="•"/>
             </a:pPr>
             <a:r>
-              <a:rPr lang="en-US" dirty="0" err="1"/>
+              <a:rPr lang="en-US" sz="1400" dirty="0" err="1"/>
               <a:t>Cloudinary</a:t>
+            </a:r>
+            <a:endParaRPr lang="en-US" dirty="0"/>
+          </a:p>
+          <a:p>
+            <a:pPr marL="285750" indent="-285750">
+              <a:buFont typeface="Arial" panose="020B0604020202020204" pitchFamily="34" charset="0"/>
+              <a:buChar char="•"/>
+            </a:pPr>
+            <a:r>
+              <a:rPr lang="en-US" dirty="0"/>
+              <a:t>Deployment</a:t>
+            </a:r>
+          </a:p>
+          <a:p>
+            <a:pPr marL="742950" lvl="1" indent="-285750">
+              <a:buFont typeface="Arial" panose="020B0604020202020204" pitchFamily="34" charset="0"/>
+              <a:buChar char="•"/>
+            </a:pPr>
+            <a:r>
+              <a:rPr lang="en-US" sz="1400" dirty="0"/>
+              <a:t>Heroku</a:t>
             </a:r>
             <a:endParaRPr lang="en-US" dirty="0"/>
           </a:p>

</xml_diff>